<commit_message>
Presentation has been changed
</commit_message>
<xml_diff>
--- a/Project proposal.pptx
+++ b/Project proposal.pptx
@@ -217,7 +217,7 @@
           <a:p>
             <a:fld id="{CE39AE01-76B9-47F1-97D9-9D931A3E7CAD}" type="datetimeFigureOut">
               <a:rPr lang="en-US" smtClean="0"/>
-              <a:t>2/14/2023</a:t>
+              <a:t>2/15/2023</a:t>
             </a:fld>
             <a:endParaRPr lang="en-US" dirty="0"/>
           </a:p>
@@ -2281,7 +2281,7 @@
           <a:p>
             <a:fld id="{9DCAE073-B2A3-429B-9FF7-963590C1FEAC}" type="datetimeFigureOut">
               <a:rPr lang="en-US" smtClean="0"/>
-              <a:t>2/14/2023</a:t>
+              <a:t>2/15/2023</a:t>
             </a:fld>
             <a:endParaRPr lang="en-US" dirty="0"/>
           </a:p>
@@ -3113,8 +3113,9 @@
                 <a:solidFill>
                   <a:schemeClr val="bg1"/>
                 </a:solidFill>
-                <a:latin typeface="Franklin Gothic Book" panose="020B0503020102020204" pitchFamily="34" charset="0"/>
-                <a:cs typeface="Calibri" panose="020F0502020204030204" pitchFamily="34" charset="0"/>
+                <a:latin typeface="Open Sans" panose="020B0606030504020204" pitchFamily="34" charset="0"/>
+                <a:ea typeface="Open Sans" panose="020B0606030504020204" pitchFamily="34" charset="0"/>
+                <a:cs typeface="Open Sans" panose="020B0606030504020204" pitchFamily="34" charset="0"/>
               </a:rPr>
               <a:t>Project By:</a:t>
             </a:r>
@@ -3125,10 +3126,11 @@
                 <a:solidFill>
                   <a:schemeClr val="bg1"/>
                 </a:solidFill>
-                <a:latin typeface="Franklin Gothic Book" panose="020B0503020102020204" pitchFamily="34" charset="0"/>
-                <a:cs typeface="Calibri" panose="020F0502020204030204" pitchFamily="34" charset="0"/>
+                <a:latin typeface="Open Sans" panose="020B0606030504020204" pitchFamily="34" charset="0"/>
+                <a:ea typeface="Open Sans" panose="020B0606030504020204" pitchFamily="34" charset="0"/>
+                <a:cs typeface="Open Sans" panose="020B0606030504020204" pitchFamily="34" charset="0"/>
               </a:rPr>
-              <a:t>      Swarneshwar -21pw25</a:t>
+              <a:t>      Swarneshwar -21PW25</a:t>
             </a:r>
           </a:p>
           <a:p>
@@ -3137,10 +3139,11 @@
                 <a:solidFill>
                   <a:schemeClr val="bg1"/>
                 </a:solidFill>
-                <a:latin typeface="Franklin Gothic Book" panose="020B0503020102020204" pitchFamily="34" charset="0"/>
-                <a:cs typeface="Calibri" panose="020F0502020204030204" pitchFamily="34" charset="0"/>
+                <a:latin typeface="Open Sans" panose="020B0606030504020204" pitchFamily="34" charset="0"/>
+                <a:ea typeface="Open Sans" panose="020B0606030504020204" pitchFamily="34" charset="0"/>
+                <a:cs typeface="Open Sans" panose="020B0606030504020204" pitchFamily="34" charset="0"/>
               </a:rPr>
-              <a:t>      Athmikha-21pw04</a:t>
+              <a:t>      Athmikha-21PW04</a:t>
             </a:r>
           </a:p>
           <a:p>
@@ -3149,10 +3152,11 @@
                 <a:solidFill>
                   <a:schemeClr val="bg1"/>
                 </a:solidFill>
-                <a:latin typeface="Franklin Gothic Book" panose="020B0503020102020204" pitchFamily="34" charset="0"/>
-                <a:cs typeface="Calibri" panose="020F0502020204030204" pitchFamily="34" charset="0"/>
+                <a:latin typeface="Open Sans" panose="020B0606030504020204" pitchFamily="34" charset="0"/>
+                <a:ea typeface="Open Sans" panose="020B0606030504020204" pitchFamily="34" charset="0"/>
+                <a:cs typeface="Open Sans" panose="020B0606030504020204" pitchFamily="34" charset="0"/>
               </a:rPr>
-              <a:t>      Thirusha-21pw39</a:t>
+              <a:t>      Thirusha-21PW39</a:t>
             </a:r>
           </a:p>
         </p:txBody>
@@ -4648,7 +4652,7 @@
         </p:nvSpPr>
         <p:spPr>
           <a:xfrm>
-            <a:off x="6209574" y="488504"/>
+            <a:off x="6209574" y="520034"/>
             <a:ext cx="5452217" cy="5900870"/>
           </a:xfrm>
           <a:prstGeom prst="rect">
@@ -4971,7 +4975,7 @@
         <p:spPr bwMode="auto">
           <a:xfrm>
             <a:off x="6455344" y="3541163"/>
-            <a:ext cx="4666543" cy="391582"/>
+            <a:ext cx="4666543" cy="760914"/>
           </a:xfrm>
           <a:prstGeom prst="rect">
             <a:avLst/>
@@ -5001,7 +5005,7 @@
                 <a:ea typeface="Open Sans" panose="020B0606030504020204" pitchFamily="34" charset="0"/>
                 <a:cs typeface="Open Sans" panose="020B0606030504020204" pitchFamily="34" charset="0"/>
               </a:rPr>
-              <a:t> You can edit this text for your presentation</a:t>
+              <a:t> Credit wallets can be used incase the preferred method of payment is not available</a:t>
             </a:r>
           </a:p>
         </p:txBody>
@@ -7021,13 +7025,13 @@
   <p:clrMapOvr>
     <a:masterClrMapping/>
   </p:clrMapOvr>
-  <mc:AlternateContent xmlns:mc="http://schemas.openxmlformats.org/markup-compatibility/2006">
-    <mc:Choice xmlns:p14="http://schemas.microsoft.com/office/powerpoint/2010/main" Requires="p14">
+  <mc:AlternateContent xmlns:mc="http://schemas.openxmlformats.org/markup-compatibility/2006" xmlns:p14="http://schemas.microsoft.com/office/powerpoint/2010/main">
+    <mc:Choice Requires="p14">
       <p:transition spd="med" p14:dur="700">
         <p:fade/>
       </p:transition>
     </mc:Choice>
-    <mc:Fallback>
+    <mc:Fallback xmlns="">
       <p:transition spd="med">
         <p:fade/>
       </p:transition>
@@ -7864,7 +7868,7 @@
                 <a:ea typeface="Open Sans" panose="020B0606030504020204" pitchFamily="34" charset="0"/>
                 <a:cs typeface="Open Sans" panose="020B0606030504020204" pitchFamily="34" charset="0"/>
               </a:rPr>
-              <a:t>Making online in different shops using make orders option</a:t>
+              <a:t>Making online orders in different shops using make orders option</a:t>
             </a:r>
           </a:p>
         </p:txBody>

</xml_diff>

<commit_message>
sessions was implemented, nodejs routes added
</commit_message>
<xml_diff>
--- a/Project proposal.pptx
+++ b/Project proposal.pptx
@@ -217,7 +217,7 @@
           <a:p>
             <a:fld id="{CE39AE01-76B9-47F1-97D9-9D931A3E7CAD}" type="datetimeFigureOut">
               <a:rPr lang="en-US" smtClean="0"/>
-              <a:t>2/15/2023</a:t>
+              <a:t>2/23/2023</a:t>
             </a:fld>
             <a:endParaRPr lang="en-US" dirty="0"/>
           </a:p>
@@ -2281,7 +2281,7 @@
           <a:p>
             <a:fld id="{9DCAE073-B2A3-429B-9FF7-963590C1FEAC}" type="datetimeFigureOut">
               <a:rPr lang="en-US" smtClean="0"/>
-              <a:t>2/15/2023</a:t>
+              <a:t>2/23/2023</a:t>
             </a:fld>
             <a:endParaRPr lang="en-US" dirty="0"/>
           </a:p>
@@ -2999,7 +2999,7 @@
           </a:ln>
           <a:extLst>
             <a:ext uri="{909E8E84-426E-40dd-AFC4-6F175D3DCCD1}">
-              <a14:hiddenFill xmlns:a14="http://schemas.microsoft.com/office/drawing/2010/main" xmlns="">
+              <a14:hiddenFill xmlns="" xmlns:a14="http://schemas.microsoft.com/office/drawing/2010/main">
                 <a:solidFill>
                   <a:srgbClr val="FFFFFF"/>
                 </a:solidFill>
@@ -3457,7 +3457,7 @@
           </a:ln>
           <a:extLst>
             <a:ext uri="{909E8E84-426E-40dd-AFC4-6F175D3DCCD1}">
-              <a14:hiddenFill xmlns:a14="http://schemas.microsoft.com/office/drawing/2010/main" xmlns="">
+              <a14:hiddenFill xmlns="" xmlns:a14="http://schemas.microsoft.com/office/drawing/2010/main">
                 <a:solidFill>
                   <a:srgbClr val="FFFFFF"/>
                 </a:solidFill>
@@ -3494,8 +3494,8 @@
         </p:blipFill>
         <p:spPr>
           <a:xfrm>
-            <a:off x="10382765" y="0"/>
-            <a:ext cx="1785422" cy="721119"/>
+            <a:off x="10163503" y="0"/>
+            <a:ext cx="2004684" cy="809677"/>
           </a:xfrm>
           <a:prstGeom prst="rect">
             <a:avLst/>
@@ -3863,7 +3863,7 @@
           </a:ln>
           <a:extLst>
             <a:ext uri="{909E8E84-426E-40dd-AFC4-6F175D3DCCD1}">
-              <a14:hiddenFill xmlns:a14="http://schemas.microsoft.com/office/drawing/2010/main" xmlns="">
+              <a14:hiddenFill xmlns="" xmlns:a14="http://schemas.microsoft.com/office/drawing/2010/main">
                 <a:solidFill>
                   <a:srgbClr val="FFFFFF"/>
                 </a:solidFill>
@@ -6433,7 +6433,7 @@
           </a:ln>
           <a:extLst>
             <a:ext uri="{909E8E84-426E-40dd-AFC4-6F175D3DCCD1}">
-              <a14:hiddenFill xmlns:a14="http://schemas.microsoft.com/office/drawing/2010/main" xmlns="">
+              <a14:hiddenFill xmlns="" xmlns:a14="http://schemas.microsoft.com/office/drawing/2010/main">
                 <a:solidFill>
                   <a:srgbClr val="FFFFFF"/>
                 </a:solidFill>
@@ -6970,7 +6970,7 @@
           </a:ln>
           <a:extLst>
             <a:ext uri="{909E8E84-426E-40dd-AFC4-6F175D3DCCD1}">
-              <a14:hiddenFill xmlns="" xmlns:a14="http://schemas.microsoft.com/office/drawing/2010/main">
+              <a14:hiddenFill xmlns:a14="http://schemas.microsoft.com/office/drawing/2010/main" xmlns="">
                 <a:solidFill>
                   <a:srgbClr val="FFFFFF"/>
                 </a:solidFill>
@@ -7362,7 +7362,7 @@
           </a:ln>
           <a:extLst>
             <a:ext uri="{909E8E84-426E-40dd-AFC4-6F175D3DCCD1}">
-              <a14:hiddenFill xmlns="" xmlns:a14="http://schemas.microsoft.com/office/drawing/2010/main">
+              <a14:hiddenFill xmlns:a14="http://schemas.microsoft.com/office/drawing/2010/main" xmlns="">
                 <a:solidFill>
                   <a:srgbClr val="FFFFFF"/>
                 </a:solidFill>

</xml_diff>